<commit_message>
created ppt 3 aggregates
</commit_message>
<xml_diff>
--- a/SQL/02-Filtering and Ordering Results in SQL - Final.pptx
+++ b/SQL/02-Filtering and Ordering Results in SQL - Final.pptx
@@ -27256,27 +27256,46 @@
                 <a:effectLst/>
                 <a:latin typeface="-apple-system"/>
               </a:rPr>
-              <a:t>We will query and analyze some </a:t>
-            </a:r>
-            <a:r>
-              <a:rPr lang="en-US" b="0" i="0" dirty="0" err="1">
-                <a:solidFill>
-                  <a:srgbClr val="1C1917"/>
-                </a:solidFill>
-                <a:effectLst/>
-                <a:latin typeface="-apple-system"/>
-              </a:rPr>
-              <a:t>AdventureWorks</a:t>
-            </a:r>
-            <a:r>
-              <a:rPr lang="en-US" b="0" i="0" dirty="0">
-                <a:solidFill>
-                  <a:srgbClr val="1C1917"/>
-                </a:solidFill>
-                <a:effectLst/>
-                <a:latin typeface="-apple-system"/>
-              </a:rPr>
-              <a:t> tables</a:t>
+              <a:t>We will query and analyze </a:t>
+            </a:r>
+            <a:r>
+              <a:rPr lang="en-US" dirty="0">
+                <a:solidFill>
+                  <a:srgbClr val="1C1917"/>
+                </a:solidFill>
+                <a:latin typeface="-apple-system"/>
+              </a:rPr>
+              <a:t>data </a:t>
+            </a:r>
+            <a:r>
+              <a:rPr lang="en-US" b="1" i="0" dirty="0">
+                <a:solidFill>
+                  <a:srgbClr val="1C1917"/>
+                </a:solidFill>
+                <a:effectLst/>
+                <a:latin typeface="-apple-system"/>
+              </a:rPr>
+              <a:t>Using the </a:t>
+            </a:r>
+            <a:r>
+              <a:rPr lang="en-US" b="1" i="0" dirty="0" err="1">
+                <a:solidFill>
+                  <a:srgbClr val="1C1917"/>
+                </a:solidFill>
+                <a:effectLst/>
+                <a:latin typeface="-apple-system"/>
+              </a:rPr>
+              <a:t>Production.Product</a:t>
+            </a:r>
+            <a:r>
+              <a:rPr lang="en-US" b="1" i="0" dirty="0">
+                <a:solidFill>
+                  <a:srgbClr val="1C1917"/>
+                </a:solidFill>
+                <a:effectLst/>
+                <a:latin typeface="-apple-system"/>
+              </a:rPr>
+              <a:t> table</a:t>
             </a:r>
           </a:p>
           <a:p>
@@ -27646,34 +27665,23 @@
           </a:p>
           <a:p>
             <a:r>
-              <a:rPr lang="en-US" b="0" i="0" dirty="0">
-                <a:solidFill>
-                  <a:srgbClr val="1C1917"/>
-                </a:solidFill>
-                <a:effectLst/>
-                <a:latin typeface="-apple-system"/>
-              </a:rPr>
-              <a:t>Using the </a:t>
-            </a:r>
-            <a:r>
-              <a:rPr lang="en-US" b="0" i="0" dirty="0" err="1">
-                <a:solidFill>
-                  <a:srgbClr val="1C1917"/>
-                </a:solidFill>
-                <a:effectLst/>
-                <a:latin typeface="-apple-system"/>
-              </a:rPr>
-              <a:t>Production.Product</a:t>
-            </a:r>
-            <a:r>
-              <a:rPr lang="en-US" b="0" i="0" dirty="0">
-                <a:solidFill>
-                  <a:srgbClr val="1C1917"/>
-                </a:solidFill>
-                <a:effectLst/>
-                <a:latin typeface="-apple-system"/>
-              </a:rPr>
-              <a:t> table, construct a WHERE clause to filter data based on the scenarios:</a:t>
+              <a:rPr lang="en-US" dirty="0">
+                <a:solidFill>
+                  <a:srgbClr val="1C1917"/>
+                </a:solidFill>
+                <a:latin typeface="-apple-system"/>
+              </a:rPr>
+              <a:t>C</a:t>
+            </a:r>
+            <a:r>
+              <a:rPr lang="en-US" b="0" i="0" dirty="0">
+                <a:solidFill>
+                  <a:srgbClr val="1C1917"/>
+                </a:solidFill>
+                <a:effectLst/>
+                <a:latin typeface="-apple-system"/>
+              </a:rPr>
+              <a:t>onstruct a WHERE clause to filter data based on the scenarios:</a:t>
             </a:r>
           </a:p>
           <a:p>
@@ -28105,9 +28113,8 @@
             </a:r>
           </a:p>
           <a:p>
-            <a:pPr lvl="2">
-              <a:buFont typeface="+mj-lt"/>
-              <a:buAutoNum type="arabicPeriod"/>
+            <a:pPr marL="914400" lvl="2" indent="0">
+              <a:buNone/>
             </a:pPr>
             <a:r>
               <a:rPr lang="en-US" b="0" i="0" dirty="0">
@@ -28190,9 +28197,8 @@
             </a:r>
           </a:p>
           <a:p>
-            <a:pPr lvl="2">
-              <a:buFont typeface="+mj-lt"/>
-              <a:buAutoNum type="arabicPeriod"/>
+            <a:pPr marL="914400" lvl="2" indent="0">
+              <a:buNone/>
             </a:pPr>
             <a:r>
               <a:rPr lang="en-US" b="0" i="0" dirty="0">
@@ -28295,9 +28301,8 @@
             </a:r>
           </a:p>
           <a:p>
-            <a:pPr lvl="2">
-              <a:buFont typeface="+mj-lt"/>
-              <a:buAutoNum type="arabicPeriod"/>
+            <a:pPr marL="914400" lvl="2" indent="0">
+              <a:buNone/>
             </a:pPr>
             <a:r>
               <a:rPr lang="en-US" b="0" i="0" dirty="0">
@@ -28754,34 +28759,23 @@
           </a:p>
           <a:p>
             <a:r>
-              <a:rPr lang="en-US" b="0" i="0" dirty="0">
-                <a:solidFill>
-                  <a:srgbClr val="1C1917"/>
-                </a:solidFill>
-                <a:effectLst/>
-                <a:latin typeface="-apple-system"/>
-              </a:rPr>
-              <a:t>Using the </a:t>
-            </a:r>
-            <a:r>
-              <a:rPr lang="en-US" b="0" i="0" dirty="0" err="1">
-                <a:solidFill>
-                  <a:srgbClr val="1C1917"/>
-                </a:solidFill>
-                <a:effectLst/>
-                <a:latin typeface="-apple-system"/>
-              </a:rPr>
-              <a:t>Production.Product</a:t>
-            </a:r>
-            <a:r>
-              <a:rPr lang="en-US" b="0" i="0" dirty="0">
-                <a:solidFill>
-                  <a:srgbClr val="1C1917"/>
-                </a:solidFill>
-                <a:effectLst/>
-                <a:latin typeface="-apple-system"/>
-              </a:rPr>
-              <a:t> table, construct a WHERE clause to filter data based on the scenarios:</a:t>
+              <a:rPr lang="en-US" dirty="0">
+                <a:solidFill>
+                  <a:srgbClr val="1C1917"/>
+                </a:solidFill>
+                <a:latin typeface="-apple-system"/>
+              </a:rPr>
+              <a:t>C</a:t>
+            </a:r>
+            <a:r>
+              <a:rPr lang="en-US" b="0" i="0" dirty="0">
+                <a:solidFill>
+                  <a:srgbClr val="1C1917"/>
+                </a:solidFill>
+                <a:effectLst/>
+                <a:latin typeface="-apple-system"/>
+              </a:rPr>
+              <a:t>onstruct a WHERE clause to filter data based on the scenarios:</a:t>
             </a:r>
           </a:p>
           <a:p>
@@ -29213,9 +29207,8 @@
             </a:r>
           </a:p>
           <a:p>
-            <a:pPr lvl="2">
-              <a:buFont typeface="+mj-lt"/>
-              <a:buAutoNum type="arabicPeriod"/>
+            <a:pPr marL="914400" lvl="2" indent="0">
+              <a:buNone/>
             </a:pPr>
             <a:r>
               <a:rPr lang="en-US" b="0" i="0" dirty="0">
@@ -29294,9 +29287,8 @@
             </a:r>
           </a:p>
           <a:p>
-            <a:pPr lvl="2">
-              <a:buFont typeface="+mj-lt"/>
-              <a:buAutoNum type="arabicPeriod"/>
+            <a:pPr marL="914400" lvl="2" indent="0">
+              <a:buNone/>
             </a:pPr>
             <a:r>
               <a:rPr lang="en-US" b="0" i="0" dirty="0">
@@ -29359,9 +29351,8 @@
             </a:r>
           </a:p>
           <a:p>
-            <a:pPr lvl="2">
-              <a:buFont typeface="+mj-lt"/>
-              <a:buAutoNum type="arabicPeriod"/>
+            <a:pPr marL="914400" lvl="2" indent="0">
+              <a:buNone/>
             </a:pPr>
             <a:r>
               <a:rPr lang="en-US" b="0" i="0" dirty="0">
@@ -29722,34 +29713,23 @@
           </a:p>
           <a:p>
             <a:r>
-              <a:rPr lang="en-US" b="0" i="0" dirty="0">
-                <a:solidFill>
-                  <a:srgbClr val="1C1917"/>
-                </a:solidFill>
-                <a:effectLst/>
-                <a:latin typeface="-apple-system"/>
-              </a:rPr>
-              <a:t>Using the </a:t>
-            </a:r>
-            <a:r>
-              <a:rPr lang="en-US" b="0" i="0" dirty="0" err="1">
-                <a:solidFill>
-                  <a:srgbClr val="1C1917"/>
-                </a:solidFill>
-                <a:effectLst/>
-                <a:latin typeface="-apple-system"/>
-              </a:rPr>
-              <a:t>Production.Product</a:t>
-            </a:r>
-            <a:r>
-              <a:rPr lang="en-US" b="0" i="0" dirty="0">
-                <a:solidFill>
-                  <a:srgbClr val="1C1917"/>
-                </a:solidFill>
-                <a:effectLst/>
-                <a:latin typeface="-apple-system"/>
-              </a:rPr>
-              <a:t> table, construct a WHERE clause to filter data based on the scenarios:</a:t>
+              <a:rPr lang="en-US" dirty="0">
+                <a:solidFill>
+                  <a:srgbClr val="1C1917"/>
+                </a:solidFill>
+                <a:latin typeface="-apple-system"/>
+              </a:rPr>
+              <a:t>C</a:t>
+            </a:r>
+            <a:r>
+              <a:rPr lang="en-US" b="0" i="0" dirty="0">
+                <a:solidFill>
+                  <a:srgbClr val="1C1917"/>
+                </a:solidFill>
+                <a:effectLst/>
+                <a:latin typeface="-apple-system"/>
+              </a:rPr>
+              <a:t>onstruct a WHERE clause to filter data based on the scenarios:</a:t>
             </a:r>
           </a:p>
           <a:p>
@@ -30241,9 +30221,8 @@
             </a:r>
           </a:p>
           <a:p>
-            <a:pPr lvl="2">
-              <a:buFont typeface="+mj-lt"/>
-              <a:buAutoNum type="arabicPeriod"/>
+            <a:pPr marL="914400" lvl="2" indent="0">
+              <a:buNone/>
             </a:pPr>
             <a:r>
               <a:rPr lang="en-US" b="0" i="0" dirty="0">
@@ -30285,13 +30264,16 @@
               </a:rPr>
               <a:t>ListPrice</a:t>
             </a:r>
-            <a:endParaRPr lang="en-US" b="0" i="0" dirty="0">
-              <a:solidFill>
-                <a:srgbClr val="1C1917"/>
-              </a:solidFill>
-              <a:effectLst/>
-              <a:latin typeface="-apple-system"/>
-            </a:endParaRPr>
+            <a:r>
+              <a:rPr lang="en-US" b="0" i="0" dirty="0">
+                <a:solidFill>
+                  <a:srgbClr val="1C1917"/>
+                </a:solidFill>
+                <a:effectLst/>
+                <a:latin typeface="-apple-system"/>
+              </a:rPr>
+              <a:t>;</a:t>
+            </a:r>
           </a:p>
           <a:p>
             <a:pPr lvl="1">
@@ -30343,9 +30325,8 @@
             </a:r>
           </a:p>
           <a:p>
-            <a:pPr lvl="2">
-              <a:buFont typeface="+mj-lt"/>
-              <a:buAutoNum type="arabicPeriod"/>
+            <a:pPr marL="914400" lvl="2" indent="0">
+              <a:buNone/>
             </a:pPr>
             <a:r>
               <a:rPr lang="en-US" b="0" i="0" dirty="0">
@@ -30395,7 +30376,7 @@
                 <a:effectLst/>
                 <a:latin typeface="-apple-system"/>
               </a:rPr>
-              <a:t> DESC</a:t>
+              <a:t> DESC;</a:t>
             </a:r>
           </a:p>
           <a:p>
@@ -30428,9 +30409,8 @@
             </a:r>
           </a:p>
           <a:p>
-            <a:pPr lvl="2">
-              <a:buFont typeface="+mj-lt"/>
-              <a:buAutoNum type="arabicPeriod"/>
+            <a:pPr marL="914400" lvl="2" indent="0">
+              <a:buNone/>
             </a:pPr>
             <a:r>
               <a:rPr lang="en-US" b="0" i="0" dirty="0">
@@ -30480,7 +30460,7 @@
                 <a:effectLst/>
                 <a:latin typeface="-apple-system"/>
               </a:rPr>
-              <a:t> DESC, Name</a:t>
+              <a:t> DESC, Name;</a:t>
             </a:r>
             <a:endParaRPr lang="en-US" b="0" i="0" dirty="0">
               <a:solidFill>
@@ -31541,7 +31521,27 @@
                 <a:effectLst/>
                 <a:latin typeface="-apple-system"/>
               </a:rPr>
-              <a:t>sing the World Wide Importers Database</a:t>
+              <a:t>sing the </a:t>
+            </a:r>
+            <a:r>
+              <a:rPr lang="en-US" b="0" i="0" dirty="0" err="1">
+                <a:solidFill>
+                  <a:srgbClr val="24292F"/>
+                </a:solidFill>
+                <a:effectLst/>
+                <a:latin typeface="-apple-system"/>
+              </a:rPr>
+              <a:t>AdventureWorks</a:t>
+            </a:r>
+            <a:r>
+              <a:rPr lang="en-US" b="0" i="0" dirty="0">
+                <a:solidFill>
+                  <a:srgbClr val="24292F"/>
+                </a:solidFill>
+                <a:effectLst/>
+                <a:latin typeface="-apple-system"/>
+              </a:rPr>
+              <a:t> Database</a:t>
             </a:r>
           </a:p>
           <a:p>

</xml_diff>